<commit_message>
V2.2 -> 2 ème training -> début overfit -> 55.55% accuracy
</commit_message>
<xml_diff>
--- a/FusionModels.pptx
+++ b/FusionModels.pptx
@@ -9,6 +9,7 @@
     <p:sldId id="257" r:id="rId3"/>
     <p:sldId id="259" r:id="rId4"/>
     <p:sldId id="258" r:id="rId5"/>
+    <p:sldId id="260" r:id="rId6"/>
   </p:sldIdLst>
   <p:sldSz cx="12192000" cy="6858000"/>
   <p:notesSz cx="6858000" cy="9144000"/>
@@ -3876,6 +3877,163 @@
     <p:extLst>
       <p:ext uri="{BB962C8B-B14F-4D97-AF65-F5344CB8AC3E}">
         <p14:creationId xmlns:p14="http://schemas.microsoft.com/office/powerpoint/2010/main" val="1154921370"/>
+      </p:ext>
+    </p:extLst>
+  </p:cSld>
+  <p:clrMapOvr>
+    <a:masterClrMapping/>
+  </p:clrMapOvr>
+</p:sld>
+</file>
+
+<file path=ppt/slides/slide5.xml><?xml version="1.0" encoding="utf-8"?>
+<p:sld xmlns:a="http://schemas.openxmlformats.org/drawingml/2006/main" xmlns:r="http://schemas.openxmlformats.org/officeDocument/2006/relationships" xmlns:p="http://schemas.openxmlformats.org/presentationml/2006/main">
+  <p:cSld>
+    <p:spTree>
+      <p:nvGrpSpPr>
+        <p:cNvPr id="1" name=""/>
+        <p:cNvGrpSpPr/>
+        <p:nvPr/>
+      </p:nvGrpSpPr>
+      <p:grpSpPr>
+        <a:xfrm>
+          <a:off x="0" y="0"/>
+          <a:ext cx="0" cy="0"/>
+          <a:chOff x="0" y="0"/>
+          <a:chExt cx="0" cy="0"/>
+        </a:xfrm>
+      </p:grpSpPr>
+      <p:sp>
+        <p:nvSpPr>
+          <p:cNvPr id="2" name="Titre 1">
+            <a:extLst>
+              <a:ext uri="{FF2B5EF4-FFF2-40B4-BE49-F238E27FC236}">
+                <a16:creationId xmlns:a16="http://schemas.microsoft.com/office/drawing/2014/main" id="{864570CD-07FA-1A9B-E10B-74A11523303B}"/>
+              </a:ext>
+            </a:extLst>
+          </p:cNvPr>
+          <p:cNvSpPr>
+            <a:spLocks noGrp="1"/>
+          </p:cNvSpPr>
+          <p:nvPr>
+            <p:ph type="title"/>
+          </p:nvPr>
+        </p:nvSpPr>
+        <p:spPr/>
+        <p:txBody>
+          <a:bodyPr/>
+          <a:lstStyle/>
+          <a:p>
+            <a:r>
+              <a:rPr lang="fr-FR" dirty="0"/>
+              <a:t>V2.2: Deuxième training</a:t>
+            </a:r>
+          </a:p>
+        </p:txBody>
+      </p:sp>
+      <p:pic>
+        <p:nvPicPr>
+          <p:cNvPr id="5" name="Image 4">
+            <a:extLst>
+              <a:ext uri="{FF2B5EF4-FFF2-40B4-BE49-F238E27FC236}">
+                <a16:creationId xmlns:a16="http://schemas.microsoft.com/office/drawing/2014/main" id="{46D0C900-751A-BC5F-6883-D449D98066C0}"/>
+              </a:ext>
+            </a:extLst>
+          </p:cNvPr>
+          <p:cNvPicPr>
+            <a:picLocks noChangeAspect="1"/>
+          </p:cNvPicPr>
+          <p:nvPr/>
+        </p:nvPicPr>
+        <p:blipFill>
+          <a:blip r:embed="rId2"/>
+          <a:stretch>
+            <a:fillRect/>
+          </a:stretch>
+        </p:blipFill>
+        <p:spPr>
+          <a:xfrm>
+            <a:off x="537528" y="3429000"/>
+            <a:ext cx="4433307" cy="2889623"/>
+          </a:xfrm>
+          <a:prstGeom prst="rect">
+            <a:avLst/>
+          </a:prstGeom>
+        </p:spPr>
+      </p:pic>
+      <p:pic>
+        <p:nvPicPr>
+          <p:cNvPr id="7" name="Image 6">
+            <a:extLst>
+              <a:ext uri="{FF2B5EF4-FFF2-40B4-BE49-F238E27FC236}">
+                <a16:creationId xmlns:a16="http://schemas.microsoft.com/office/drawing/2014/main" id="{0AD37F46-6BD2-93D9-214D-6954FD191AC2}"/>
+              </a:ext>
+            </a:extLst>
+          </p:cNvPr>
+          <p:cNvPicPr>
+            <a:picLocks noChangeAspect="1"/>
+          </p:cNvPicPr>
+          <p:nvPr/>
+        </p:nvPicPr>
+        <p:blipFill>
+          <a:blip r:embed="rId3"/>
+          <a:stretch>
+            <a:fillRect/>
+          </a:stretch>
+        </p:blipFill>
+        <p:spPr>
+          <a:xfrm>
+            <a:off x="5265603" y="1408586"/>
+            <a:ext cx="6088197" cy="2526009"/>
+          </a:xfrm>
+          <a:prstGeom prst="rect">
+            <a:avLst/>
+          </a:prstGeom>
+        </p:spPr>
+      </p:pic>
+      <p:sp>
+        <p:nvSpPr>
+          <p:cNvPr id="8" name="ZoneTexte 7">
+            <a:extLst>
+              <a:ext uri="{FF2B5EF4-FFF2-40B4-BE49-F238E27FC236}">
+                <a16:creationId xmlns:a16="http://schemas.microsoft.com/office/drawing/2014/main" id="{8E246556-64BC-5260-74DE-0B02BEE76195}"/>
+              </a:ext>
+            </a:extLst>
+          </p:cNvPr>
+          <p:cNvSpPr txBox="1"/>
+          <p:nvPr/>
+        </p:nvSpPr>
+        <p:spPr>
+          <a:xfrm>
+            <a:off x="6196519" y="5291847"/>
+            <a:ext cx="1974195" cy="369332"/>
+          </a:xfrm>
+          <a:prstGeom prst="rect">
+            <a:avLst/>
+          </a:prstGeom>
+          <a:noFill/>
+        </p:spPr>
+        <p:txBody>
+          <a:bodyPr wrap="none" rtlCol="0">
+            <a:spAutoFit/>
+          </a:bodyPr>
+          <a:lstStyle/>
+          <a:p>
+            <a:r>
+              <a:rPr lang="fr-FR" dirty="0" err="1"/>
+              <a:t>Accuracy</a:t>
+            </a:r>
+            <a:r>
+              <a:rPr lang="fr-FR" dirty="0"/>
+              <a:t>: 55,55%</a:t>
+            </a:r>
+          </a:p>
+        </p:txBody>
+      </p:sp>
+    </p:spTree>
+    <p:extLst>
+      <p:ext uri="{BB962C8B-B14F-4D97-AF65-F5344CB8AC3E}">
+        <p14:creationId xmlns:p14="http://schemas.microsoft.com/office/powerpoint/2010/main" val="464326911"/>
       </p:ext>
     </p:extLst>
   </p:cSld>

</xml_diff>

<commit_message>
Troisième training du modèle -> baisse de l'accuracy. Changement de procédé -> je vais entrainer un modèle uniquement sur les yeux pour voir ce que ça donne. J'ai print les 100 premières paires d'yeux detectés et je pense que du 50x50 c'est trop -> tester en réduisant (32x32 pourquoi pas) Je vais commencer par faire ça avant de continuer sur la feature fusion
</commit_message>
<xml_diff>
--- a/FusionModels.pptx
+++ b/FusionModels.pptx
@@ -263,7 +263,7 @@
           <a:p>
             <a:fld id="{D156EBFD-91D9-47B9-AB59-E420B5D42D34}" type="datetimeFigureOut">
               <a:rPr lang="fr-FR" smtClean="0"/>
-              <a:t>09/06/2025</a:t>
+              <a:t>11/06/2025</a:t>
             </a:fld>
             <a:endParaRPr lang="fr-FR"/>
           </a:p>
@@ -461,7 +461,7 @@
           <a:p>
             <a:fld id="{D156EBFD-91D9-47B9-AB59-E420B5D42D34}" type="datetimeFigureOut">
               <a:rPr lang="fr-FR" smtClean="0"/>
-              <a:t>09/06/2025</a:t>
+              <a:t>11/06/2025</a:t>
             </a:fld>
             <a:endParaRPr lang="fr-FR"/>
           </a:p>
@@ -669,7 +669,7 @@
           <a:p>
             <a:fld id="{D156EBFD-91D9-47B9-AB59-E420B5D42D34}" type="datetimeFigureOut">
               <a:rPr lang="fr-FR" smtClean="0"/>
-              <a:t>09/06/2025</a:t>
+              <a:t>11/06/2025</a:t>
             </a:fld>
             <a:endParaRPr lang="fr-FR"/>
           </a:p>
@@ -867,7 +867,7 @@
           <a:p>
             <a:fld id="{D156EBFD-91D9-47B9-AB59-E420B5D42D34}" type="datetimeFigureOut">
               <a:rPr lang="fr-FR" smtClean="0"/>
-              <a:t>09/06/2025</a:t>
+              <a:t>11/06/2025</a:t>
             </a:fld>
             <a:endParaRPr lang="fr-FR"/>
           </a:p>
@@ -1142,7 +1142,7 @@
           <a:p>
             <a:fld id="{D156EBFD-91D9-47B9-AB59-E420B5D42D34}" type="datetimeFigureOut">
               <a:rPr lang="fr-FR" smtClean="0"/>
-              <a:t>09/06/2025</a:t>
+              <a:t>11/06/2025</a:t>
             </a:fld>
             <a:endParaRPr lang="fr-FR"/>
           </a:p>
@@ -1407,7 +1407,7 @@
           <a:p>
             <a:fld id="{D156EBFD-91D9-47B9-AB59-E420B5D42D34}" type="datetimeFigureOut">
               <a:rPr lang="fr-FR" smtClean="0"/>
-              <a:t>09/06/2025</a:t>
+              <a:t>11/06/2025</a:t>
             </a:fld>
             <a:endParaRPr lang="fr-FR"/>
           </a:p>
@@ -1819,7 +1819,7 @@
           <a:p>
             <a:fld id="{D156EBFD-91D9-47B9-AB59-E420B5D42D34}" type="datetimeFigureOut">
               <a:rPr lang="fr-FR" smtClean="0"/>
-              <a:t>09/06/2025</a:t>
+              <a:t>11/06/2025</a:t>
             </a:fld>
             <a:endParaRPr lang="fr-FR"/>
           </a:p>
@@ -1960,7 +1960,7 @@
           <a:p>
             <a:fld id="{D156EBFD-91D9-47B9-AB59-E420B5D42D34}" type="datetimeFigureOut">
               <a:rPr lang="fr-FR" smtClean="0"/>
-              <a:t>09/06/2025</a:t>
+              <a:t>11/06/2025</a:t>
             </a:fld>
             <a:endParaRPr lang="fr-FR"/>
           </a:p>
@@ -2073,7 +2073,7 @@
           <a:p>
             <a:fld id="{D156EBFD-91D9-47B9-AB59-E420B5D42D34}" type="datetimeFigureOut">
               <a:rPr lang="fr-FR" smtClean="0"/>
-              <a:t>09/06/2025</a:t>
+              <a:t>11/06/2025</a:t>
             </a:fld>
             <a:endParaRPr lang="fr-FR"/>
           </a:p>
@@ -2384,7 +2384,7 @@
           <a:p>
             <a:fld id="{D156EBFD-91D9-47B9-AB59-E420B5D42D34}" type="datetimeFigureOut">
               <a:rPr lang="fr-FR" smtClean="0"/>
-              <a:t>09/06/2025</a:t>
+              <a:t>11/06/2025</a:t>
             </a:fld>
             <a:endParaRPr lang="fr-FR"/>
           </a:p>
@@ -2672,7 +2672,7 @@
           <a:p>
             <a:fld id="{D156EBFD-91D9-47B9-AB59-E420B5D42D34}" type="datetimeFigureOut">
               <a:rPr lang="fr-FR" smtClean="0"/>
-              <a:t>09/06/2025</a:t>
+              <a:t>11/06/2025</a:t>
             </a:fld>
             <a:endParaRPr lang="fr-FR"/>
           </a:p>
@@ -2913,7 +2913,7 @@
           <a:p>
             <a:fld id="{D156EBFD-91D9-47B9-AB59-E420B5D42D34}" type="datetimeFigureOut">
               <a:rPr lang="fr-FR" smtClean="0"/>
-              <a:t>09/06/2025</a:t>
+              <a:t>11/06/2025</a:t>
             </a:fld>
             <a:endParaRPr lang="fr-FR"/>
           </a:p>

</xml_diff>